<commit_message>
Updates M0 and M7.
</commit_message>
<xml_diff>
--- a/M7_Summary/M7_Best_Practices.pptx
+++ b/M7_Summary/M7_Best_Practices.pptx
@@ -5,7 +5,7 @@
     <p:sldMasterId id="2147483656" r:id="rId1"/>
   </p:sldMasterIdLst>
   <p:notesMasterIdLst>
-    <p:notesMasterId r:id="rId11"/>
+    <p:notesMasterId r:id="rId13"/>
   </p:notesMasterIdLst>
   <p:sldIdLst>
     <p:sldId id="256" r:id="rId2"/>
@@ -17,6 +17,8 @@
     <p:sldId id="262" r:id="rId8"/>
     <p:sldId id="264" r:id="rId9"/>
     <p:sldId id="265" r:id="rId10"/>
+    <p:sldId id="260" r:id="rId11"/>
+    <p:sldId id="270" r:id="rId12"/>
   </p:sldIdLst>
   <p:sldSz cx="12192000" cy="6858000"/>
   <p:notesSz cx="6858000" cy="9144000"/>
@@ -2489,6 +2491,644 @@
     <p:extLst>
       <p:ext uri="{BB962C8B-B14F-4D97-AF65-F5344CB8AC3E}">
         <p14:creationId xmlns:p14="http://schemas.microsoft.com/office/powerpoint/2010/main" val="2380909950"/>
+      </p:ext>
+    </p:extLst>
+  </p:cSld>
+  <p:clrMapOvr>
+    <a:masterClrMapping/>
+  </p:clrMapOvr>
+</p:sld>
+</file>
+
+<file path=ppt/slides/slide10.xml><?xml version="1.0" encoding="utf-8"?>
+<p:sld xmlns:a="http://schemas.openxmlformats.org/drawingml/2006/main" xmlns:r="http://schemas.openxmlformats.org/officeDocument/2006/relationships" xmlns:p="http://schemas.openxmlformats.org/presentationml/2006/main">
+  <p:cSld>
+    <p:spTree>
+      <p:nvGrpSpPr>
+        <p:cNvPr id="1" name=""/>
+        <p:cNvGrpSpPr/>
+        <p:nvPr/>
+      </p:nvGrpSpPr>
+      <p:grpSpPr>
+        <a:xfrm>
+          <a:off x="0" y="0"/>
+          <a:ext cx="0" cy="0"/>
+          <a:chOff x="0" y="0"/>
+          <a:chExt cx="0" cy="0"/>
+        </a:xfrm>
+      </p:grpSpPr>
+      <p:sp>
+        <p:nvSpPr>
+          <p:cNvPr id="2" name="Title 1">
+            <a:extLst>
+              <a:ext uri="{FF2B5EF4-FFF2-40B4-BE49-F238E27FC236}">
+                <a16:creationId xmlns:a16="http://schemas.microsoft.com/office/drawing/2014/main" id="{58765C25-9764-0E33-75E8-12E088084A39}"/>
+              </a:ext>
+            </a:extLst>
+          </p:cNvPr>
+          <p:cNvSpPr>
+            <a:spLocks noGrp="1"/>
+          </p:cNvSpPr>
+          <p:nvPr>
+            <p:ph type="title"/>
+          </p:nvPr>
+        </p:nvSpPr>
+        <p:spPr/>
+        <p:txBody>
+          <a:bodyPr/>
+          <a:lstStyle/>
+          <a:p>
+            <a:r>
+              <a:rPr lang="en-US" dirty="0"/>
+              <a:t>Learning Objectives</a:t>
+            </a:r>
+          </a:p>
+        </p:txBody>
+      </p:sp>
+      <p:sp>
+        <p:nvSpPr>
+          <p:cNvPr id="3" name="TextBox 2">
+            <a:extLst>
+              <a:ext uri="{FF2B5EF4-FFF2-40B4-BE49-F238E27FC236}">
+                <a16:creationId xmlns:a16="http://schemas.microsoft.com/office/drawing/2014/main" id="{6757D76D-6074-C2ED-67AD-8966978C323E}"/>
+              </a:ext>
+            </a:extLst>
+          </p:cNvPr>
+          <p:cNvSpPr txBox="1"/>
+          <p:nvPr/>
+        </p:nvSpPr>
+        <p:spPr>
+          <a:xfrm>
+            <a:off x="851317" y="2155350"/>
+            <a:ext cx="7806240" cy="1477328"/>
+          </a:xfrm>
+          <a:prstGeom prst="rect">
+            <a:avLst/>
+          </a:prstGeom>
+          <a:noFill/>
+        </p:spPr>
+        <p:txBody>
+          <a:bodyPr wrap="none" rtlCol="0">
+            <a:spAutoFit/>
+          </a:bodyPr>
+          <a:lstStyle/>
+          <a:p>
+            <a:pPr marL="342900" indent="-342900">
+              <a:buAutoNum type="arabicPeriod"/>
+            </a:pPr>
+            <a:r>
+              <a:rPr lang="en-US" dirty="0"/>
+              <a:t>Understand the </a:t>
+            </a:r>
+            <a:r>
+              <a:rPr lang="en-US" b="1" dirty="0"/>
+              <a:t>basic process </a:t>
+            </a:r>
+            <a:r>
+              <a:rPr lang="en-US" dirty="0"/>
+              <a:t>of </a:t>
+            </a:r>
+            <a:r>
+              <a:rPr lang="en-US" i="1" dirty="0"/>
+              <a:t>how</a:t>
+            </a:r>
+            <a:r>
+              <a:rPr lang="en-US" dirty="0"/>
+              <a:t> single cell RNA-seq is analyzed.</a:t>
+            </a:r>
+          </a:p>
+          <a:p>
+            <a:pPr marL="342900" indent="-342900">
+              <a:buAutoNum type="arabicPeriod"/>
+            </a:pPr>
+            <a:r>
+              <a:rPr lang="en-US" dirty="0"/>
+              <a:t>Familiarity with </a:t>
+            </a:r>
+            <a:r>
+              <a:rPr lang="en-US" b="1" dirty="0"/>
+              <a:t>standard processing pipeline </a:t>
+            </a:r>
+            <a:r>
+              <a:rPr lang="en-US" dirty="0"/>
+              <a:t>with Seurat.</a:t>
+            </a:r>
+          </a:p>
+          <a:p>
+            <a:pPr marL="342900" indent="-342900">
+              <a:buAutoNum type="arabicPeriod"/>
+            </a:pPr>
+            <a:r>
+              <a:rPr lang="en-US" dirty="0"/>
+              <a:t>Intuitive understanding of the </a:t>
+            </a:r>
+            <a:r>
+              <a:rPr lang="en-US" u="sng" dirty="0"/>
+              <a:t>need</a:t>
+            </a:r>
+            <a:r>
+              <a:rPr lang="en-US" dirty="0"/>
+              <a:t> and </a:t>
+            </a:r>
+            <a:r>
+              <a:rPr lang="en-US" u="sng" dirty="0"/>
+              <a:t>concept</a:t>
+            </a:r>
+            <a:r>
+              <a:rPr lang="en-US" dirty="0"/>
+              <a:t> for each part of the pipeline.</a:t>
+            </a:r>
+          </a:p>
+          <a:p>
+            <a:pPr marL="342900" indent="-342900">
+              <a:buAutoNum type="arabicPeriod"/>
+            </a:pPr>
+            <a:r>
+              <a:rPr lang="en-US" dirty="0"/>
+              <a:t>Performs </a:t>
+            </a:r>
+            <a:r>
+              <a:rPr lang="en-US" b="1" dirty="0"/>
+              <a:t>basic DGE </a:t>
+            </a:r>
+            <a:r>
+              <a:rPr lang="en-US" dirty="0"/>
+              <a:t>and </a:t>
+            </a:r>
+            <a:r>
+              <a:rPr lang="en-US" b="1" dirty="0"/>
+              <a:t>cell type labelling</a:t>
+            </a:r>
+            <a:r>
+              <a:rPr lang="en-US" dirty="0"/>
+              <a:t>.</a:t>
+            </a:r>
+          </a:p>
+          <a:p>
+            <a:pPr marL="342900" indent="-342900">
+              <a:buAutoNum type="arabicPeriod"/>
+            </a:pPr>
+            <a:r>
+              <a:rPr lang="en-US" dirty="0"/>
+              <a:t>Use Monocle to perform </a:t>
+            </a:r>
+            <a:r>
+              <a:rPr lang="en-US" b="1" dirty="0"/>
+              <a:t>cell trajectory </a:t>
+            </a:r>
+            <a:r>
+              <a:rPr lang="en-US" dirty="0"/>
+              <a:t>and</a:t>
+            </a:r>
+            <a:r>
+              <a:rPr lang="en-US" b="1" dirty="0"/>
+              <a:t> cell fate </a:t>
+            </a:r>
+            <a:r>
+              <a:rPr lang="en-US" dirty="0"/>
+              <a:t>analysis.</a:t>
+            </a:r>
+          </a:p>
+        </p:txBody>
+      </p:sp>
+      <p:sp>
+        <p:nvSpPr>
+          <p:cNvPr id="4" name="TextBox 3">
+            <a:extLst>
+              <a:ext uri="{FF2B5EF4-FFF2-40B4-BE49-F238E27FC236}">
+                <a16:creationId xmlns:a16="http://schemas.microsoft.com/office/drawing/2014/main" id="{37C6ECF8-D496-670E-A9DF-AE4459849618}"/>
+              </a:ext>
+            </a:extLst>
+          </p:cNvPr>
+          <p:cNvSpPr txBox="1"/>
+          <p:nvPr/>
+        </p:nvSpPr>
+        <p:spPr>
+          <a:xfrm>
+            <a:off x="409575" y="1048559"/>
+            <a:ext cx="10189082" cy="923330"/>
+          </a:xfrm>
+          <a:prstGeom prst="rect">
+            <a:avLst/>
+          </a:prstGeom>
+          <a:noFill/>
+        </p:spPr>
+        <p:txBody>
+          <a:bodyPr wrap="square" rtlCol="0">
+            <a:spAutoFit/>
+          </a:bodyPr>
+          <a:lstStyle/>
+          <a:p>
+            <a:r>
+              <a:rPr lang="en-US" b="1" dirty="0"/>
+              <a:t>Overarching Purpose</a:t>
+            </a:r>
+            <a:r>
+              <a:rPr lang="en-US" dirty="0"/>
+              <a:t>: to help participants beat the </a:t>
+            </a:r>
+            <a:r>
+              <a:rPr lang="en-US" u="sng" dirty="0"/>
+              <a:t>steep learning curve </a:t>
+            </a:r>
+            <a:r>
+              <a:rPr lang="en-US" dirty="0"/>
+              <a:t>with basics of processing and interpreting </a:t>
+            </a:r>
+            <a:r>
+              <a:rPr lang="en-US" dirty="0" err="1"/>
+              <a:t>scRNA</a:t>
+            </a:r>
+            <a:r>
+              <a:rPr lang="en-US" dirty="0"/>
+              <a:t>-Seq Data. Participants will be empowered to effectively learn new analysis techniques from the understanding developed in this workshop. </a:t>
+            </a:r>
+          </a:p>
+        </p:txBody>
+      </p:sp>
+      <p:sp>
+        <p:nvSpPr>
+          <p:cNvPr id="6" name="TextBox 5">
+            <a:extLst>
+              <a:ext uri="{FF2B5EF4-FFF2-40B4-BE49-F238E27FC236}">
+                <a16:creationId xmlns:a16="http://schemas.microsoft.com/office/drawing/2014/main" id="{5737BBDF-B1CC-0D5F-5B94-098270B7F3DC}"/>
+              </a:ext>
+            </a:extLst>
+          </p:cNvPr>
+          <p:cNvSpPr txBox="1"/>
+          <p:nvPr/>
+        </p:nvSpPr>
+        <p:spPr>
+          <a:xfrm>
+            <a:off x="409575" y="3966179"/>
+            <a:ext cx="3986784" cy="369332"/>
+          </a:xfrm>
+          <a:prstGeom prst="rect">
+            <a:avLst/>
+          </a:prstGeom>
+          <a:noFill/>
+        </p:spPr>
+        <p:txBody>
+          <a:bodyPr wrap="square" rtlCol="0">
+            <a:spAutoFit/>
+          </a:bodyPr>
+          <a:lstStyle/>
+          <a:p>
+            <a:r>
+              <a:rPr lang="en-US" dirty="0"/>
+              <a:t>What does this workshop </a:t>
+            </a:r>
+            <a:r>
+              <a:rPr lang="en-US" i="1" dirty="0"/>
+              <a:t>not cover</a:t>
+            </a:r>
+            <a:r>
+              <a:rPr lang="en-US" dirty="0"/>
+              <a:t>?</a:t>
+            </a:r>
+          </a:p>
+        </p:txBody>
+      </p:sp>
+      <p:sp>
+        <p:nvSpPr>
+          <p:cNvPr id="13" name="TextBox 12">
+            <a:extLst>
+              <a:ext uri="{FF2B5EF4-FFF2-40B4-BE49-F238E27FC236}">
+                <a16:creationId xmlns:a16="http://schemas.microsoft.com/office/drawing/2014/main" id="{A1E74A5C-BFC7-A063-2D15-8CB1B5099B4F}"/>
+              </a:ext>
+            </a:extLst>
+          </p:cNvPr>
+          <p:cNvSpPr txBox="1"/>
+          <p:nvPr/>
+        </p:nvSpPr>
+        <p:spPr>
+          <a:xfrm>
+            <a:off x="851317" y="4476989"/>
+            <a:ext cx="7052034" cy="2031325"/>
+          </a:xfrm>
+          <a:prstGeom prst="rect">
+            <a:avLst/>
+          </a:prstGeom>
+          <a:noFill/>
+        </p:spPr>
+        <p:txBody>
+          <a:bodyPr wrap="square" rtlCol="0">
+            <a:spAutoFit/>
+          </a:bodyPr>
+          <a:lstStyle/>
+          <a:p>
+            <a:pPr marL="342900" indent="-342900">
+              <a:buAutoNum type="arabicPeriod"/>
+            </a:pPr>
+            <a:r>
+              <a:rPr lang="en-US" dirty="0"/>
+              <a:t>How to </a:t>
+            </a:r>
+            <a:r>
+              <a:rPr lang="en-US" b="1" dirty="0"/>
+              <a:t>experimentally confirm </a:t>
+            </a:r>
+            <a:r>
+              <a:rPr lang="en-US" dirty="0"/>
+              <a:t>your single cell results following the standard of practice for your </a:t>
+            </a:r>
+            <a:r>
+              <a:rPr lang="en-US" b="1" dirty="0"/>
+              <a:t>subfield</a:t>
+            </a:r>
+            <a:r>
+              <a:rPr lang="en-US" dirty="0"/>
+              <a:t>.</a:t>
+            </a:r>
+          </a:p>
+          <a:p>
+            <a:pPr marL="342900" indent="-342900">
+              <a:buAutoNum type="arabicPeriod"/>
+            </a:pPr>
+            <a:r>
+              <a:rPr lang="en-US" dirty="0"/>
+              <a:t>How to generate </a:t>
+            </a:r>
+            <a:r>
+              <a:rPr lang="en-US" i="1" dirty="0"/>
+              <a:t>high fidelity </a:t>
+            </a:r>
+            <a:r>
+              <a:rPr lang="en-US" dirty="0"/>
+              <a:t>cell type labels (can take months/ years of effort).</a:t>
+            </a:r>
+          </a:p>
+          <a:p>
+            <a:pPr marL="342900" indent="-342900">
+              <a:buAutoNum type="arabicPeriod"/>
+            </a:pPr>
+            <a:r>
+              <a:rPr lang="en-US" dirty="0"/>
+              <a:t>A </a:t>
+            </a:r>
+            <a:r>
+              <a:rPr lang="en-US" b="1" dirty="0"/>
+              <a:t>mathematical understanding </a:t>
+            </a:r>
+            <a:r>
+              <a:rPr lang="en-US" dirty="0"/>
+              <a:t>of the processing pipeline.</a:t>
+            </a:r>
+          </a:p>
+          <a:p>
+            <a:pPr marL="342900" indent="-342900">
+              <a:buAutoNum type="arabicPeriod"/>
+            </a:pPr>
+            <a:r>
+              <a:rPr lang="en-US" dirty="0"/>
+              <a:t>How to tailor these </a:t>
+            </a:r>
+            <a:r>
+              <a:rPr lang="en-US" i="1" dirty="0"/>
+              <a:t>standard concepts </a:t>
+            </a:r>
+            <a:r>
+              <a:rPr lang="en-US" dirty="0"/>
+              <a:t>to your </a:t>
+            </a:r>
+            <a:r>
+              <a:rPr lang="en-US" b="1" dirty="0"/>
+              <a:t>specific research needs</a:t>
+            </a:r>
+            <a:r>
+              <a:rPr lang="en-US" dirty="0"/>
+              <a:t>.</a:t>
+            </a:r>
+          </a:p>
+        </p:txBody>
+      </p:sp>
+    </p:spTree>
+    <p:extLst>
+      <p:ext uri="{BB962C8B-B14F-4D97-AF65-F5344CB8AC3E}">
+        <p14:creationId xmlns:p14="http://schemas.microsoft.com/office/powerpoint/2010/main" val="1634902693"/>
+      </p:ext>
+    </p:extLst>
+  </p:cSld>
+  <p:clrMapOvr>
+    <a:masterClrMapping/>
+  </p:clrMapOvr>
+</p:sld>
+</file>
+
+<file path=ppt/slides/slide11.xml><?xml version="1.0" encoding="utf-8"?>
+<p:sld xmlns:a="http://schemas.openxmlformats.org/drawingml/2006/main" xmlns:r="http://schemas.openxmlformats.org/officeDocument/2006/relationships" xmlns:p="http://schemas.openxmlformats.org/presentationml/2006/main">
+  <p:cSld>
+    <p:spTree>
+      <p:nvGrpSpPr>
+        <p:cNvPr id="1" name=""/>
+        <p:cNvGrpSpPr/>
+        <p:nvPr/>
+      </p:nvGrpSpPr>
+      <p:grpSpPr>
+        <a:xfrm>
+          <a:off x="0" y="0"/>
+          <a:ext cx="0" cy="0"/>
+          <a:chOff x="0" y="0"/>
+          <a:chExt cx="0" cy="0"/>
+        </a:xfrm>
+      </p:grpSpPr>
+      <p:sp>
+        <p:nvSpPr>
+          <p:cNvPr id="2" name="Title 1">
+            <a:extLst>
+              <a:ext uri="{FF2B5EF4-FFF2-40B4-BE49-F238E27FC236}">
+                <a16:creationId xmlns:a16="http://schemas.microsoft.com/office/drawing/2014/main" id="{58765C25-9764-0E33-75E8-12E088084A39}"/>
+              </a:ext>
+            </a:extLst>
+          </p:cNvPr>
+          <p:cNvSpPr>
+            <a:spLocks noGrp="1"/>
+          </p:cNvSpPr>
+          <p:nvPr>
+            <p:ph type="title"/>
+          </p:nvPr>
+        </p:nvSpPr>
+        <p:spPr/>
+        <p:txBody>
+          <a:bodyPr/>
+          <a:lstStyle/>
+          <a:p>
+            <a:r>
+              <a:rPr lang="en-US" dirty="0"/>
+              <a:t>Post Workshop Assignment</a:t>
+            </a:r>
+          </a:p>
+        </p:txBody>
+      </p:sp>
+      <p:pic>
+        <p:nvPicPr>
+          <p:cNvPr id="9" name="Picture 8">
+            <a:extLst>
+              <a:ext uri="{FF2B5EF4-FFF2-40B4-BE49-F238E27FC236}">
+                <a16:creationId xmlns:a16="http://schemas.microsoft.com/office/drawing/2014/main" id="{6FE7108D-A252-880A-29EF-7A19351F8BD6}"/>
+              </a:ext>
+            </a:extLst>
+          </p:cNvPr>
+          <p:cNvPicPr>
+            <a:picLocks noChangeAspect="1"/>
+          </p:cNvPicPr>
+          <p:nvPr/>
+        </p:nvPicPr>
+        <p:blipFill>
+          <a:blip r:embed="rId2"/>
+          <a:stretch>
+            <a:fillRect/>
+          </a:stretch>
+        </p:blipFill>
+        <p:spPr>
+          <a:xfrm>
+            <a:off x="267527" y="869285"/>
+            <a:ext cx="5721793" cy="1774433"/>
+          </a:xfrm>
+          <a:prstGeom prst="rect">
+            <a:avLst/>
+          </a:prstGeom>
+        </p:spPr>
+      </p:pic>
+      <p:pic>
+        <p:nvPicPr>
+          <p:cNvPr id="1026" name="Picture 2" descr="Fig. 2">
+            <a:extLst>
+              <a:ext uri="{FF2B5EF4-FFF2-40B4-BE49-F238E27FC236}">
+                <a16:creationId xmlns:a16="http://schemas.microsoft.com/office/drawing/2014/main" id="{C30EB48F-5A05-9871-AED8-BC86F6590615}"/>
+              </a:ext>
+            </a:extLst>
+          </p:cNvPr>
+          <p:cNvPicPr>
+            <a:picLocks noChangeAspect="1" noChangeArrowheads="1"/>
+          </p:cNvPicPr>
+          <p:nvPr/>
+        </p:nvPicPr>
+        <p:blipFill rotWithShape="1">
+          <a:blip r:embed="rId3">
+            <a:extLst>
+              <a:ext uri="{28A0092B-C50C-407E-A947-70E740481C1C}">
+                <a14:useLocalDpi xmlns:a14="http://schemas.microsoft.com/office/drawing/2010/main" val="0"/>
+              </a:ext>
+            </a:extLst>
+          </a:blip>
+          <a:srcRect r="75369" b="47145"/>
+          <a:stretch/>
+        </p:blipFill>
+        <p:spPr bwMode="auto">
+          <a:xfrm>
+            <a:off x="6612268" y="869285"/>
+            <a:ext cx="2191657" cy="5473458"/>
+          </a:xfrm>
+          <a:prstGeom prst="rect">
+            <a:avLst/>
+          </a:prstGeom>
+          <a:noFill/>
+          <a:extLst>
+            <a:ext uri="{909E8E84-426E-40DD-AFC4-6F175D3DCCD1}">
+              <a14:hiddenFill xmlns:a14="http://schemas.microsoft.com/office/drawing/2010/main">
+                <a:solidFill>
+                  <a:srgbClr val="FFFFFF"/>
+                </a:solidFill>
+              </a14:hiddenFill>
+            </a:ext>
+          </a:extLst>
+        </p:spPr>
+      </p:pic>
+      <p:pic>
+        <p:nvPicPr>
+          <p:cNvPr id="10" name="Picture 2" descr="Fig. 2">
+            <a:extLst>
+              <a:ext uri="{FF2B5EF4-FFF2-40B4-BE49-F238E27FC236}">
+                <a16:creationId xmlns:a16="http://schemas.microsoft.com/office/drawing/2014/main" id="{A0ED3315-D036-A48E-D118-4F6E10332981}"/>
+              </a:ext>
+            </a:extLst>
+          </p:cNvPr>
+          <p:cNvPicPr>
+            <a:picLocks noChangeAspect="1" noChangeArrowheads="1"/>
+          </p:cNvPicPr>
+          <p:nvPr/>
+        </p:nvPicPr>
+        <p:blipFill rotWithShape="1">
+          <a:blip r:embed="rId3">
+            <a:extLst>
+              <a:ext uri="{28A0092B-C50C-407E-A947-70E740481C1C}">
+                <a14:useLocalDpi xmlns:a14="http://schemas.microsoft.com/office/drawing/2010/main" val="0"/>
+              </a:ext>
+            </a:extLst>
+          </a:blip>
+          <a:srcRect l="50246" b="60389"/>
+          <a:stretch/>
+        </p:blipFill>
+        <p:spPr bwMode="auto">
+          <a:xfrm>
+            <a:off x="988864" y="2975374"/>
+            <a:ext cx="3974659" cy="3682708"/>
+          </a:xfrm>
+          <a:prstGeom prst="rect">
+            <a:avLst/>
+          </a:prstGeom>
+          <a:noFill/>
+          <a:extLst>
+            <a:ext uri="{909E8E84-426E-40DD-AFC4-6F175D3DCCD1}">
+              <a14:hiddenFill xmlns:a14="http://schemas.microsoft.com/office/drawing/2010/main">
+                <a:solidFill>
+                  <a:srgbClr val="FFFFFF"/>
+                </a:solidFill>
+              </a14:hiddenFill>
+            </a:ext>
+          </a:extLst>
+        </p:spPr>
+      </p:pic>
+      <p:pic>
+        <p:nvPicPr>
+          <p:cNvPr id="11" name="Picture 2" descr="Fig. 2">
+            <a:extLst>
+              <a:ext uri="{FF2B5EF4-FFF2-40B4-BE49-F238E27FC236}">
+                <a16:creationId xmlns:a16="http://schemas.microsoft.com/office/drawing/2014/main" id="{CBB7283C-B804-6853-9C89-0D9360A1E7FA}"/>
+              </a:ext>
+            </a:extLst>
+          </p:cNvPr>
+          <p:cNvPicPr>
+            <a:picLocks noChangeAspect="1" noChangeArrowheads="1"/>
+          </p:cNvPicPr>
+          <p:nvPr/>
+        </p:nvPicPr>
+        <p:blipFill rotWithShape="1">
+          <a:blip r:embed="rId3">
+            <a:extLst>
+              <a:ext uri="{28A0092B-C50C-407E-A947-70E740481C1C}">
+                <a14:useLocalDpi xmlns:a14="http://schemas.microsoft.com/office/drawing/2010/main" val="0"/>
+              </a:ext>
+            </a:extLst>
+          </a:blip>
+          <a:srcRect t="49590" r="75369"/>
+          <a:stretch/>
+        </p:blipFill>
+        <p:spPr bwMode="auto">
+          <a:xfrm>
+            <a:off x="9443849" y="1026099"/>
+            <a:ext cx="2017642" cy="4805801"/>
+          </a:xfrm>
+          <a:prstGeom prst="rect">
+            <a:avLst/>
+          </a:prstGeom>
+          <a:noFill/>
+          <a:extLst>
+            <a:ext uri="{909E8E84-426E-40DD-AFC4-6F175D3DCCD1}">
+              <a14:hiddenFill xmlns:a14="http://schemas.microsoft.com/office/drawing/2010/main">
+                <a:solidFill>
+                  <a:srgbClr val="FFFFFF"/>
+                </a:solidFill>
+              </a14:hiddenFill>
+            </a:ext>
+          </a:extLst>
+        </p:spPr>
+      </p:pic>
+    </p:spTree>
+    <p:extLst>
+      <p:ext uri="{BB962C8B-B14F-4D97-AF65-F5344CB8AC3E}">
+        <p14:creationId xmlns:p14="http://schemas.microsoft.com/office/powerpoint/2010/main" val="3770920332"/>
       </p:ext>
     </p:extLst>
   </p:cSld>

</xml_diff>

<commit_message>
Updates M0, M3, M7.
</commit_message>
<xml_diff>
--- a/M7_Summary/M7_Best_Practices.pptx
+++ b/M7_Summary/M7_Best_Practices.pptx
@@ -5,7 +5,7 @@
     <p:sldMasterId id="2147483656" r:id="rId1"/>
   </p:sldMasterIdLst>
   <p:notesMasterIdLst>
-    <p:notesMasterId r:id="rId13"/>
+    <p:notesMasterId r:id="rId14"/>
   </p:notesMasterIdLst>
   <p:sldIdLst>
     <p:sldId id="256" r:id="rId2"/>
@@ -15,10 +15,11 @@
     <p:sldId id="268" r:id="rId6"/>
     <p:sldId id="269" r:id="rId7"/>
     <p:sldId id="262" r:id="rId8"/>
-    <p:sldId id="264" r:id="rId9"/>
-    <p:sldId id="265" r:id="rId10"/>
-    <p:sldId id="260" r:id="rId11"/>
-    <p:sldId id="270" r:id="rId12"/>
+    <p:sldId id="271" r:id="rId9"/>
+    <p:sldId id="264" r:id="rId10"/>
+    <p:sldId id="265" r:id="rId11"/>
+    <p:sldId id="260" r:id="rId12"/>
+    <p:sldId id="270" r:id="rId13"/>
   </p:sldIdLst>
   <p:sldSz cx="12192000" cy="6858000"/>
   <p:notesSz cx="6858000" cy="9144000"/>
@@ -2522,6 +2523,99 @@
           <p:cNvPr id="2" name="Title 1">
             <a:extLst>
               <a:ext uri="{FF2B5EF4-FFF2-40B4-BE49-F238E27FC236}">
+                <a16:creationId xmlns:a16="http://schemas.microsoft.com/office/drawing/2014/main" id="{CD43B99E-6447-04B6-9A03-5D54778593DD}"/>
+              </a:ext>
+            </a:extLst>
+          </p:cNvPr>
+          <p:cNvSpPr>
+            <a:spLocks noGrp="1"/>
+          </p:cNvSpPr>
+          <p:nvPr>
+            <p:ph type="title"/>
+          </p:nvPr>
+        </p:nvSpPr>
+        <p:spPr/>
+        <p:txBody>
+          <a:bodyPr/>
+          <a:lstStyle/>
+          <a:p>
+            <a:r>
+              <a:rPr lang="en-US" dirty="0"/>
+              <a:t>The Challenge of Reproducibility</a:t>
+            </a:r>
+          </a:p>
+        </p:txBody>
+      </p:sp>
+      <p:sp>
+        <p:nvSpPr>
+          <p:cNvPr id="4" name="TextBox 3">
+            <a:extLst>
+              <a:ext uri="{FF2B5EF4-FFF2-40B4-BE49-F238E27FC236}">
+                <a16:creationId xmlns:a16="http://schemas.microsoft.com/office/drawing/2014/main" id="{FBB465FF-77F1-494A-1CC8-270A63C3DA00}"/>
+              </a:ext>
+            </a:extLst>
+          </p:cNvPr>
+          <p:cNvSpPr txBox="1"/>
+          <p:nvPr/>
+        </p:nvSpPr>
+        <p:spPr>
+          <a:xfrm>
+            <a:off x="566166" y="1146810"/>
+            <a:ext cx="3213893" cy="369332"/>
+          </a:xfrm>
+          <a:prstGeom prst="rect">
+            <a:avLst/>
+          </a:prstGeom>
+          <a:noFill/>
+        </p:spPr>
+        <p:txBody>
+          <a:bodyPr wrap="none" rtlCol="0">
+            <a:spAutoFit/>
+          </a:bodyPr>
+          <a:lstStyle/>
+          <a:p>
+            <a:r>
+              <a:rPr lang="en-US" dirty="0"/>
+              <a:t>Part of the challenge of making  </a:t>
+            </a:r>
+          </a:p>
+        </p:txBody>
+      </p:sp>
+    </p:spTree>
+    <p:extLst>
+      <p:ext uri="{BB962C8B-B14F-4D97-AF65-F5344CB8AC3E}">
+        <p14:creationId xmlns:p14="http://schemas.microsoft.com/office/powerpoint/2010/main" val="1583192240"/>
+      </p:ext>
+    </p:extLst>
+  </p:cSld>
+  <p:clrMapOvr>
+    <a:masterClrMapping/>
+  </p:clrMapOvr>
+</p:sld>
+</file>
+
+<file path=ppt/slides/slide11.xml><?xml version="1.0" encoding="utf-8"?>
+<p:sld xmlns:a="http://schemas.openxmlformats.org/drawingml/2006/main" xmlns:r="http://schemas.openxmlformats.org/officeDocument/2006/relationships" xmlns:p="http://schemas.openxmlformats.org/presentationml/2006/main">
+  <p:cSld>
+    <p:spTree>
+      <p:nvGrpSpPr>
+        <p:cNvPr id="1" name=""/>
+        <p:cNvGrpSpPr/>
+        <p:nvPr/>
+      </p:nvGrpSpPr>
+      <p:grpSpPr>
+        <a:xfrm>
+          <a:off x="0" y="0"/>
+          <a:ext cx="0" cy="0"/>
+          <a:chOff x="0" y="0"/>
+          <a:chExt cx="0" cy="0"/>
+        </a:xfrm>
+      </p:grpSpPr>
+      <p:sp>
+        <p:nvSpPr>
+          <p:cNvPr id="2" name="Title 1">
+            <a:extLst>
+              <a:ext uri="{FF2B5EF4-FFF2-40B4-BE49-F238E27FC236}">
                 <a16:creationId xmlns:a16="http://schemas.microsoft.com/office/drawing/2014/main" id="{58765C25-9764-0E33-75E8-12E088084A39}"/>
               </a:ext>
             </a:extLst>
@@ -2915,7 +3009,7 @@
 </p:sld>
 </file>
 
-<file path=ppt/slides/slide11.xml><?xml version="1.0" encoding="utf-8"?>
+<file path=ppt/slides/slide12.xml><?xml version="1.0" encoding="utf-8"?>
 <p:sld xmlns:a="http://schemas.openxmlformats.org/drawingml/2006/main" xmlns:r="http://schemas.openxmlformats.org/officeDocument/2006/relationships" xmlns:p="http://schemas.openxmlformats.org/presentationml/2006/main">
   <p:cSld>
     <p:spTree>
@@ -11047,7 +11141,7 @@
           <a:p>
             <a:r>
               <a:rPr lang="en-US" dirty="0"/>
-              <a:t>Topics Not Covered: Cell Annotation</a:t>
+              <a:t>Topics Not Covered: High Fidelity Cell Annotation</a:t>
             </a:r>
           </a:p>
         </p:txBody>
@@ -11081,7 +11175,7 @@
         </p:blipFill>
         <p:spPr bwMode="auto">
           <a:xfrm>
-            <a:off x="1274191" y="1106424"/>
+            <a:off x="1245616" y="839724"/>
             <a:ext cx="5454191" cy="4946904"/>
           </a:xfrm>
           <a:prstGeom prst="rect">
@@ -11157,6 +11251,237 @@
               <a:t>RNA Biol. 2020 Jun;17(6):765-783.</a:t>
             </a:r>
             <a:endParaRPr lang="en-US" sz="1100" dirty="0"/>
+          </a:p>
+        </p:txBody>
+      </p:sp>
+      <p:sp>
+        <p:nvSpPr>
+          <p:cNvPr id="3" name="TextBox 2">
+            <a:extLst>
+              <a:ext uri="{FF2B5EF4-FFF2-40B4-BE49-F238E27FC236}">
+                <a16:creationId xmlns:a16="http://schemas.microsoft.com/office/drawing/2014/main" id="{7723F501-D81A-A0F8-E4AD-18A1CDA473C6}"/>
+              </a:ext>
+            </a:extLst>
+          </p:cNvPr>
+          <p:cNvSpPr txBox="1"/>
+          <p:nvPr/>
+        </p:nvSpPr>
+        <p:spPr>
+          <a:xfrm>
+            <a:off x="8829676" y="3992877"/>
+            <a:ext cx="2602484" cy="646331"/>
+          </a:xfrm>
+          <a:prstGeom prst="rect">
+            <a:avLst/>
+          </a:prstGeom>
+          <a:noFill/>
+          <a:ln>
+            <a:solidFill>
+              <a:schemeClr val="tx1"/>
+            </a:solidFill>
+          </a:ln>
+        </p:spPr>
+        <p:txBody>
+          <a:bodyPr wrap="square" rtlCol="0">
+            <a:spAutoFit/>
+          </a:bodyPr>
+          <a:lstStyle/>
+          <a:p>
+            <a:pPr algn="ctr"/>
+            <a:r>
+              <a:rPr lang="en-US" dirty="0"/>
+              <a:t>Literature Consensus of Cell Type Markers</a:t>
+            </a:r>
+          </a:p>
+        </p:txBody>
+      </p:sp>
+      <p:sp>
+        <p:nvSpPr>
+          <p:cNvPr id="5" name="Arrow: Down 4">
+            <a:extLst>
+              <a:ext uri="{FF2B5EF4-FFF2-40B4-BE49-F238E27FC236}">
+                <a16:creationId xmlns:a16="http://schemas.microsoft.com/office/drawing/2014/main" id="{F5091898-A7B2-D343-90E5-76FF7B63433F}"/>
+              </a:ext>
+            </a:extLst>
+          </p:cNvPr>
+          <p:cNvSpPr/>
+          <p:nvPr/>
+        </p:nvSpPr>
+        <p:spPr>
+          <a:xfrm rot="5400000">
+            <a:off x="7385415" y="3326866"/>
+            <a:ext cx="767793" cy="1295400"/>
+          </a:xfrm>
+          <a:prstGeom prst="downArrow">
+            <a:avLst/>
+          </a:prstGeom>
+          <a:solidFill>
+            <a:schemeClr val="bg1">
+              <a:lumMod val="85000"/>
+            </a:schemeClr>
+          </a:solidFill>
+          <a:ln>
+            <a:noFill/>
+          </a:ln>
+        </p:spPr>
+        <p:style>
+          <a:lnRef idx="2">
+            <a:schemeClr val="accent1">
+              <a:shade val="15000"/>
+            </a:schemeClr>
+          </a:lnRef>
+          <a:fillRef idx="1">
+            <a:schemeClr val="accent1"/>
+          </a:fillRef>
+          <a:effectRef idx="0">
+            <a:schemeClr val="accent1"/>
+          </a:effectRef>
+          <a:fontRef idx="minor">
+            <a:schemeClr val="lt1"/>
+          </a:fontRef>
+        </p:style>
+        <p:txBody>
+          <a:bodyPr rtlCol="0" anchor="ctr"/>
+          <a:lstStyle/>
+          <a:p>
+            <a:pPr algn="ctr"/>
+            <a:endParaRPr lang="en-US"/>
+          </a:p>
+        </p:txBody>
+      </p:sp>
+      <p:sp>
+        <p:nvSpPr>
+          <p:cNvPr id="6" name="TextBox 5">
+            <a:extLst>
+              <a:ext uri="{FF2B5EF4-FFF2-40B4-BE49-F238E27FC236}">
+                <a16:creationId xmlns:a16="http://schemas.microsoft.com/office/drawing/2014/main" id="{DE867C3C-4930-F0C1-03B3-C282642C9FE0}"/>
+              </a:ext>
+            </a:extLst>
+          </p:cNvPr>
+          <p:cNvSpPr txBox="1"/>
+          <p:nvPr/>
+        </p:nvSpPr>
+        <p:spPr>
+          <a:xfrm>
+            <a:off x="8829676" y="3275076"/>
+            <a:ext cx="2602484" cy="646331"/>
+          </a:xfrm>
+          <a:prstGeom prst="rect">
+            <a:avLst/>
+          </a:prstGeom>
+          <a:noFill/>
+          <a:ln>
+            <a:solidFill>
+              <a:schemeClr val="tx1"/>
+            </a:solidFill>
+          </a:ln>
+        </p:spPr>
+        <p:txBody>
+          <a:bodyPr wrap="square" rtlCol="0">
+            <a:spAutoFit/>
+          </a:bodyPr>
+          <a:lstStyle/>
+          <a:p>
+            <a:pPr algn="ctr"/>
+            <a:r>
+              <a:rPr lang="en-US" dirty="0"/>
+              <a:t>Markers from Alternative Measurement Techniques</a:t>
+            </a:r>
+          </a:p>
+        </p:txBody>
+      </p:sp>
+      <p:sp>
+        <p:nvSpPr>
+          <p:cNvPr id="7" name="Arrow: Down 6">
+            <a:extLst>
+              <a:ext uri="{FF2B5EF4-FFF2-40B4-BE49-F238E27FC236}">
+                <a16:creationId xmlns:a16="http://schemas.microsoft.com/office/drawing/2014/main" id="{302F41CE-6730-1121-EBE6-8DF7A5CA8124}"/>
+              </a:ext>
+            </a:extLst>
+          </p:cNvPr>
+          <p:cNvSpPr/>
+          <p:nvPr/>
+        </p:nvSpPr>
+        <p:spPr>
+          <a:xfrm rot="16200000">
+            <a:off x="5077662" y="4875604"/>
+            <a:ext cx="767793" cy="1295400"/>
+          </a:xfrm>
+          <a:prstGeom prst="downArrow">
+            <a:avLst/>
+          </a:prstGeom>
+          <a:solidFill>
+            <a:schemeClr val="bg1">
+              <a:lumMod val="85000"/>
+            </a:schemeClr>
+          </a:solidFill>
+          <a:ln>
+            <a:noFill/>
+          </a:ln>
+        </p:spPr>
+        <p:style>
+          <a:lnRef idx="2">
+            <a:schemeClr val="accent1">
+              <a:shade val="15000"/>
+            </a:schemeClr>
+          </a:lnRef>
+          <a:fillRef idx="1">
+            <a:schemeClr val="accent1"/>
+          </a:fillRef>
+          <a:effectRef idx="0">
+            <a:schemeClr val="accent1"/>
+          </a:effectRef>
+          <a:fontRef idx="minor">
+            <a:schemeClr val="lt1"/>
+          </a:fontRef>
+        </p:style>
+        <p:txBody>
+          <a:bodyPr rtlCol="0" anchor="ctr"/>
+          <a:lstStyle/>
+          <a:p>
+            <a:pPr algn="ctr"/>
+            <a:endParaRPr lang="en-US"/>
+          </a:p>
+        </p:txBody>
+      </p:sp>
+      <p:sp>
+        <p:nvSpPr>
+          <p:cNvPr id="8" name="TextBox 7">
+            <a:extLst>
+              <a:ext uri="{FF2B5EF4-FFF2-40B4-BE49-F238E27FC236}">
+                <a16:creationId xmlns:a16="http://schemas.microsoft.com/office/drawing/2014/main" id="{9A211E81-5561-C271-01AB-0F058047F5B2}"/>
+              </a:ext>
+            </a:extLst>
+          </p:cNvPr>
+          <p:cNvSpPr txBox="1"/>
+          <p:nvPr/>
+        </p:nvSpPr>
+        <p:spPr>
+          <a:xfrm>
+            <a:off x="6531063" y="5253731"/>
+            <a:ext cx="1885949" cy="646331"/>
+          </a:xfrm>
+          <a:prstGeom prst="rect">
+            <a:avLst/>
+          </a:prstGeom>
+          <a:noFill/>
+          <a:ln>
+            <a:solidFill>
+              <a:schemeClr val="tx1"/>
+            </a:solidFill>
+          </a:ln>
+        </p:spPr>
+        <p:txBody>
+          <a:bodyPr wrap="square" rtlCol="0">
+            <a:spAutoFit/>
+          </a:bodyPr>
+          <a:lstStyle/>
+          <a:p>
+            <a:pPr algn="ctr"/>
+            <a:r>
+              <a:rPr lang="en-US" dirty="0"/>
+              <a:t>Empirical Confirmation</a:t>
+            </a:r>
           </a:p>
         </p:txBody>
       </p:sp>
@@ -11213,13 +11538,8 @@
           <a:p>
             <a:r>
               <a:rPr lang="en-US" dirty="0"/>
-              <a:t>Confirming Cell Types and </a:t>
-            </a:r>
-            <a:r>
-              <a:rPr lang="en-US" dirty="0" err="1"/>
-              <a:t>CLustering</a:t>
-            </a:r>
-            <a:endParaRPr lang="en-US" dirty="0"/>
+              <a:t>Confirming Cell Types and Clustering</a:t>
+            </a:r>
           </a:p>
         </p:txBody>
       </p:sp>
@@ -11237,8 +11557,8 @@
         </p:nvSpPr>
         <p:spPr>
           <a:xfrm>
-            <a:off x="389674" y="3429000"/>
-            <a:ext cx="598241" cy="369332"/>
+            <a:off x="433974" y="2706467"/>
+            <a:ext cx="3708195" cy="369332"/>
           </a:xfrm>
           <a:prstGeom prst="rect">
             <a:avLst/>
@@ -11253,7 +11573,7 @@
           <a:p>
             <a:r>
               <a:rPr lang="en-US" dirty="0"/>
-              <a:t>FISH</a:t>
+              <a:t>Florescent In Situ Hybridization (FISH)</a:t>
             </a:r>
           </a:p>
         </p:txBody>
@@ -11272,8 +11592,8 @@
         </p:nvSpPr>
         <p:spPr>
           <a:xfrm>
-            <a:off x="6096000" y="2753551"/>
-            <a:ext cx="1380186" cy="369332"/>
+            <a:off x="8729472" y="736261"/>
+            <a:ext cx="3332644" cy="369332"/>
           </a:xfrm>
           <a:prstGeom prst="rect">
             <a:avLst/>
@@ -11288,7 +11608,7 @@
           <a:p>
             <a:r>
               <a:rPr lang="en-US" dirty="0"/>
-              <a:t>FACS/CYTOF </a:t>
+              <a:t>Fluorescent Activated Cell Sorting</a:t>
             </a:r>
           </a:p>
         </p:txBody>
@@ -11346,8 +11666,8 @@
         </p:nvSpPr>
         <p:spPr>
           <a:xfrm>
-            <a:off x="5475711" y="1401987"/>
-            <a:ext cx="551754" cy="369332"/>
+            <a:off x="451948" y="848047"/>
+            <a:ext cx="3284297" cy="369332"/>
           </a:xfrm>
           <a:prstGeom prst="rect">
             <a:avLst/>
@@ -11362,44 +11682,8 @@
           <a:p>
             <a:r>
               <a:rPr lang="en-US" dirty="0"/>
-              <a:t>PCR</a:t>
-            </a:r>
-          </a:p>
-        </p:txBody>
-      </p:sp>
-      <p:sp>
-        <p:nvSpPr>
-          <p:cNvPr id="10" name="TextBox 9">
-            <a:extLst>
-              <a:ext uri="{FF2B5EF4-FFF2-40B4-BE49-F238E27FC236}">
-                <a16:creationId xmlns:a16="http://schemas.microsoft.com/office/drawing/2014/main" id="{237C3321-0CBE-DAC7-479F-544C700723D8}"/>
-              </a:ext>
-            </a:extLst>
-          </p:cNvPr>
-          <p:cNvSpPr txBox="1"/>
-          <p:nvPr/>
-        </p:nvSpPr>
-        <p:spPr>
-          <a:xfrm>
-            <a:off x="6096000" y="4577479"/>
-            <a:ext cx="1477456" cy="369332"/>
-          </a:xfrm>
-          <a:prstGeom prst="rect">
-            <a:avLst/>
-          </a:prstGeom>
-          <a:noFill/>
-        </p:spPr>
-        <p:txBody>
-          <a:bodyPr wrap="none" rtlCol="0">
-            <a:spAutoFit/>
-          </a:bodyPr>
-          <a:lstStyle/>
-          <a:p>
-            <a:r>
-              <a:rPr lang="en-US"/>
-              <a:t>Laser Capture</a:t>
-            </a:r>
-            <a:endParaRPr lang="en-US" dirty="0"/>
+              <a:t>Polymerase Chain Reaction (PCR)</a:t>
+            </a:r>
           </a:p>
         </p:txBody>
       </p:sp>
@@ -11424,7 +11708,7 @@
         </p:blipFill>
         <p:spPr>
           <a:xfrm>
-            <a:off x="379729" y="5247262"/>
+            <a:off x="670474" y="5247262"/>
             <a:ext cx="4467671" cy="1196520"/>
           </a:xfrm>
           <a:prstGeom prst="rect">
@@ -11446,8 +11730,8 @@
         </p:nvSpPr>
         <p:spPr>
           <a:xfrm>
-            <a:off x="688795" y="6395597"/>
-            <a:ext cx="2289069" cy="261610"/>
+            <a:off x="779439" y="6414181"/>
+            <a:ext cx="2289069" cy="200055"/>
           </a:xfrm>
           <a:prstGeom prst="rect">
             <a:avLst/>
@@ -11461,7 +11745,7 @@
           <a:lstStyle/>
           <a:p>
             <a:r>
-              <a:rPr lang="en-US" sz="1100" b="0" i="0" dirty="0" err="1">
+              <a:rPr lang="en-US" sz="700" b="0" i="0" dirty="0" err="1">
                 <a:solidFill>
                   <a:srgbClr val="222222"/>
                 </a:solidFill>
@@ -11471,7 +11755,7 @@
               <a:t>Nobori</a:t>
             </a:r>
             <a:r>
-              <a:rPr lang="en-US" sz="1100" b="0" i="0" dirty="0">
+              <a:rPr lang="en-US" sz="700" b="0" i="0" dirty="0">
                 <a:solidFill>
                   <a:srgbClr val="222222"/>
                 </a:solidFill>
@@ -11481,7 +11765,7 @@
               <a:t>, T. </a:t>
             </a:r>
             <a:r>
-              <a:rPr lang="en-US" sz="1100" b="0" i="1" dirty="0">
+              <a:rPr lang="en-US" sz="700" b="0" i="1" dirty="0">
                 <a:solidFill>
                   <a:srgbClr val="222222"/>
                 </a:solidFill>
@@ -11491,7 +11775,7 @@
               <a:t>Nat. Plants. </a:t>
             </a:r>
             <a:r>
-              <a:rPr lang="en-US" sz="1100" b="0" i="0" dirty="0">
+              <a:rPr lang="en-US" sz="700" b="0" i="0" dirty="0">
                 <a:solidFill>
                   <a:srgbClr val="222222"/>
                 </a:solidFill>
@@ -11500,7 +11784,490 @@
               </a:rPr>
               <a:t>(2023).</a:t>
             </a:r>
-            <a:endParaRPr lang="en-US" sz="1100" dirty="0"/>
+            <a:endParaRPr lang="en-US" sz="700" dirty="0"/>
+          </a:p>
+        </p:txBody>
+      </p:sp>
+      <p:pic>
+        <p:nvPicPr>
+          <p:cNvPr id="1026" name="Picture 2" descr="In situ hybridization of two repetitive sequences to chromosomes of a wild wheat species">
+            <a:extLst>
+              <a:ext uri="{FF2B5EF4-FFF2-40B4-BE49-F238E27FC236}">
+                <a16:creationId xmlns:a16="http://schemas.microsoft.com/office/drawing/2014/main" id="{05792E8F-4264-A85B-ED75-2C85801A5B52}"/>
+              </a:ext>
+            </a:extLst>
+          </p:cNvPr>
+          <p:cNvPicPr>
+            <a:picLocks noChangeAspect="1" noChangeArrowheads="1"/>
+          </p:cNvPicPr>
+          <p:nvPr/>
+        </p:nvPicPr>
+        <p:blipFill>
+          <a:blip r:embed="rId3">
+            <a:extLst>
+              <a:ext uri="{28A0092B-C50C-407E-A947-70E740481C1C}">
+                <a14:useLocalDpi xmlns:a14="http://schemas.microsoft.com/office/drawing/2010/main" val="0"/>
+              </a:ext>
+            </a:extLst>
+          </a:blip>
+          <a:srcRect/>
+          <a:stretch>
+            <a:fillRect/>
+          </a:stretch>
+        </p:blipFill>
+        <p:spPr bwMode="auto">
+          <a:xfrm>
+            <a:off x="1200500" y="3139020"/>
+            <a:ext cx="1556887" cy="1261078"/>
+          </a:xfrm>
+          <a:prstGeom prst="rect">
+            <a:avLst/>
+          </a:prstGeom>
+          <a:noFill/>
+          <a:extLst>
+            <a:ext uri="{909E8E84-426E-40DD-AFC4-6F175D3DCCD1}">
+              <a14:hiddenFill xmlns:a14="http://schemas.microsoft.com/office/drawing/2010/main">
+                <a:solidFill>
+                  <a:srgbClr val="FFFFFF"/>
+                </a:solidFill>
+              </a14:hiddenFill>
+            </a:ext>
+          </a:extLst>
+        </p:spPr>
+      </p:pic>
+      <p:sp>
+        <p:nvSpPr>
+          <p:cNvPr id="5" name="TextBox 4">
+            <a:extLst>
+              <a:ext uri="{FF2B5EF4-FFF2-40B4-BE49-F238E27FC236}">
+                <a16:creationId xmlns:a16="http://schemas.microsoft.com/office/drawing/2014/main" id="{C5BE29E4-1840-C028-C73A-C5C977AD1616}"/>
+              </a:ext>
+            </a:extLst>
+          </p:cNvPr>
+          <p:cNvSpPr txBox="1"/>
+          <p:nvPr/>
+        </p:nvSpPr>
+        <p:spPr>
+          <a:xfrm>
+            <a:off x="1200500" y="4370285"/>
+            <a:ext cx="1916985" cy="215444"/>
+          </a:xfrm>
+          <a:prstGeom prst="rect">
+            <a:avLst/>
+          </a:prstGeom>
+          <a:noFill/>
+        </p:spPr>
+        <p:txBody>
+          <a:bodyPr wrap="square">
+            <a:spAutoFit/>
+          </a:bodyPr>
+          <a:lstStyle/>
+          <a:p>
+            <a:r>
+              <a:rPr lang="en-US" sz="800" dirty="0"/>
+              <a:t>https://molcyt.org/2013/12/19/insitu/</a:t>
+            </a:r>
+          </a:p>
+        </p:txBody>
+      </p:sp>
+      <p:pic>
+        <p:nvPicPr>
+          <p:cNvPr id="1028" name="Picture 4" descr="Flow chart illustrating both procedures used for direct PCR from fresh leaf discs without DNA extraction. A sample as small as 1 mm² was added to the PCR mix and amplified (Direct protocol). Plant material was also macerated, heat-treated, and buffer-diluted before being directly amplified (Dilution protocol)">
+            <a:extLst>
+              <a:ext uri="{FF2B5EF4-FFF2-40B4-BE49-F238E27FC236}">
+                <a16:creationId xmlns:a16="http://schemas.microsoft.com/office/drawing/2014/main" id="{09FBDA74-F957-D514-793C-41A29AAE2FB0}"/>
+              </a:ext>
+            </a:extLst>
+          </p:cNvPr>
+          <p:cNvPicPr>
+            <a:picLocks noChangeAspect="1" noChangeArrowheads="1"/>
+          </p:cNvPicPr>
+          <p:nvPr/>
+        </p:nvPicPr>
+        <p:blipFill rotWithShape="1">
+          <a:blip r:embed="rId4">
+            <a:extLst>
+              <a:ext uri="{28A0092B-C50C-407E-A947-70E740481C1C}">
+                <a14:useLocalDpi xmlns:a14="http://schemas.microsoft.com/office/drawing/2010/main" val="0"/>
+              </a:ext>
+            </a:extLst>
+          </a:blip>
+          <a:srcRect l="61445" b="57110"/>
+          <a:stretch/>
+        </p:blipFill>
+        <p:spPr bwMode="auto">
+          <a:xfrm>
+            <a:off x="1123507" y="1433655"/>
+            <a:ext cx="1579635" cy="934428"/>
+          </a:xfrm>
+          <a:prstGeom prst="rect">
+            <a:avLst/>
+          </a:prstGeom>
+          <a:noFill/>
+          <a:extLst>
+            <a:ext uri="{909E8E84-426E-40DD-AFC4-6F175D3DCCD1}">
+              <a14:hiddenFill xmlns:a14="http://schemas.microsoft.com/office/drawing/2010/main">
+                <a:solidFill>
+                  <a:srgbClr val="FFFFFF"/>
+                </a:solidFill>
+              </a14:hiddenFill>
+            </a:ext>
+          </a:extLst>
+        </p:spPr>
+      </p:pic>
+      <p:pic>
+        <p:nvPicPr>
+          <p:cNvPr id="1030" name="Picture 6" descr="CyTOF - Wikipedia">
+            <a:extLst>
+              <a:ext uri="{FF2B5EF4-FFF2-40B4-BE49-F238E27FC236}">
+                <a16:creationId xmlns:a16="http://schemas.microsoft.com/office/drawing/2014/main" id="{567CBB42-6A41-D79E-19F4-4053297470D2}"/>
+              </a:ext>
+            </a:extLst>
+          </p:cNvPr>
+          <p:cNvPicPr>
+            <a:picLocks noChangeAspect="1" noChangeArrowheads="1"/>
+          </p:cNvPicPr>
+          <p:nvPr/>
+        </p:nvPicPr>
+        <p:blipFill>
+          <a:blip r:embed="rId5">
+            <a:extLst>
+              <a:ext uri="{28A0092B-C50C-407E-A947-70E740481C1C}">
+                <a14:useLocalDpi xmlns:a14="http://schemas.microsoft.com/office/drawing/2010/main" val="0"/>
+              </a:ext>
+            </a:extLst>
+          </a:blip>
+          <a:srcRect/>
+          <a:stretch>
+            <a:fillRect/>
+          </a:stretch>
+        </p:blipFill>
+        <p:spPr bwMode="auto">
+          <a:xfrm>
+            <a:off x="6608674" y="4142406"/>
+            <a:ext cx="3708195" cy="2173158"/>
+          </a:xfrm>
+          <a:prstGeom prst="rect">
+            <a:avLst/>
+          </a:prstGeom>
+          <a:noFill/>
+          <a:extLst>
+            <a:ext uri="{909E8E84-426E-40DD-AFC4-6F175D3DCCD1}">
+              <a14:hiddenFill xmlns:a14="http://schemas.microsoft.com/office/drawing/2010/main">
+                <a:solidFill>
+                  <a:srgbClr val="FFFFFF"/>
+                </a:solidFill>
+              </a14:hiddenFill>
+            </a:ext>
+          </a:extLst>
+        </p:spPr>
+      </p:pic>
+      <p:sp>
+        <p:nvSpPr>
+          <p:cNvPr id="13" name="TextBox 12">
+            <a:extLst>
+              <a:ext uri="{FF2B5EF4-FFF2-40B4-BE49-F238E27FC236}">
+                <a16:creationId xmlns:a16="http://schemas.microsoft.com/office/drawing/2014/main" id="{CBB9BCB9-916E-CEEE-ABED-7275F59381DF}"/>
+              </a:ext>
+            </a:extLst>
+          </p:cNvPr>
+          <p:cNvSpPr txBox="1"/>
+          <p:nvPr/>
+        </p:nvSpPr>
+        <p:spPr>
+          <a:xfrm>
+            <a:off x="5994479" y="3739897"/>
+            <a:ext cx="3582162" cy="369332"/>
+          </a:xfrm>
+          <a:prstGeom prst="rect">
+            <a:avLst/>
+          </a:prstGeom>
+          <a:noFill/>
+        </p:spPr>
+        <p:txBody>
+          <a:bodyPr wrap="square">
+            <a:spAutoFit/>
+          </a:bodyPr>
+          <a:lstStyle/>
+          <a:p>
+            <a:r>
+              <a:rPr lang="en-US" dirty="0"/>
+              <a:t>Cytometry by time of flight (</a:t>
+            </a:r>
+            <a:r>
+              <a:rPr lang="en-US" dirty="0" err="1"/>
+              <a:t>CyTOF</a:t>
+            </a:r>
+            <a:r>
+              <a:rPr lang="en-US" dirty="0"/>
+              <a:t>)</a:t>
+            </a:r>
+          </a:p>
+        </p:txBody>
+      </p:sp>
+      <p:sp>
+        <p:nvSpPr>
+          <p:cNvPr id="15" name="TextBox 14">
+            <a:extLst>
+              <a:ext uri="{FF2B5EF4-FFF2-40B4-BE49-F238E27FC236}">
+                <a16:creationId xmlns:a16="http://schemas.microsoft.com/office/drawing/2014/main" id="{C22AF0B4-E031-2622-3107-B87ABE6695F0}"/>
+              </a:ext>
+            </a:extLst>
+          </p:cNvPr>
+          <p:cNvSpPr txBox="1"/>
+          <p:nvPr/>
+        </p:nvSpPr>
+        <p:spPr>
+          <a:xfrm>
+            <a:off x="6807254" y="6336976"/>
+            <a:ext cx="2289069" cy="200055"/>
+          </a:xfrm>
+          <a:prstGeom prst="rect">
+            <a:avLst/>
+          </a:prstGeom>
+          <a:noFill/>
+        </p:spPr>
+        <p:txBody>
+          <a:bodyPr wrap="square">
+            <a:spAutoFit/>
+          </a:bodyPr>
+          <a:lstStyle/>
+          <a:p>
+            <a:r>
+              <a:rPr lang="en-US" sz="700" i="1" dirty="0">
+                <a:solidFill>
+                  <a:schemeClr val="bg1">
+                    <a:lumMod val="85000"/>
+                  </a:schemeClr>
+                </a:solidFill>
+              </a:rPr>
+              <a:t>https://en.wikipedia.org/wiki/CyTOF</a:t>
+            </a:r>
+          </a:p>
+        </p:txBody>
+      </p:sp>
+      <p:pic>
+        <p:nvPicPr>
+          <p:cNvPr id="1032" name="Picture 8" descr="Fluorescence Activated Cell Sorting (FACS) | AAT Bioquest">
+            <a:extLst>
+              <a:ext uri="{FF2B5EF4-FFF2-40B4-BE49-F238E27FC236}">
+                <a16:creationId xmlns:a16="http://schemas.microsoft.com/office/drawing/2014/main" id="{F5997E6F-F812-7D9B-5D98-CFB17DAEBE26}"/>
+              </a:ext>
+            </a:extLst>
+          </p:cNvPr>
+          <p:cNvPicPr>
+            <a:picLocks noChangeAspect="1" noChangeArrowheads="1"/>
+          </p:cNvPicPr>
+          <p:nvPr/>
+        </p:nvPicPr>
+        <p:blipFill>
+          <a:blip r:embed="rId6">
+            <a:extLst>
+              <a:ext uri="{28A0092B-C50C-407E-A947-70E740481C1C}">
+                <a14:useLocalDpi xmlns:a14="http://schemas.microsoft.com/office/drawing/2010/main" val="0"/>
+              </a:ext>
+            </a:extLst>
+          </a:blip>
+          <a:srcRect/>
+          <a:stretch>
+            <a:fillRect/>
+          </a:stretch>
+        </p:blipFill>
+        <p:spPr bwMode="auto">
+          <a:xfrm>
+            <a:off x="9691267" y="1138770"/>
+            <a:ext cx="1784603" cy="2471781"/>
+          </a:xfrm>
+          <a:prstGeom prst="rect">
+            <a:avLst/>
+          </a:prstGeom>
+          <a:noFill/>
+          <a:extLst>
+            <a:ext uri="{909E8E84-426E-40DD-AFC4-6F175D3DCCD1}">
+              <a14:hiddenFill xmlns:a14="http://schemas.microsoft.com/office/drawing/2010/main">
+                <a:solidFill>
+                  <a:srgbClr val="FFFFFF"/>
+                </a:solidFill>
+              </a14:hiddenFill>
+            </a:ext>
+          </a:extLst>
+        </p:spPr>
+      </p:pic>
+      <p:sp>
+        <p:nvSpPr>
+          <p:cNvPr id="17" name="TextBox 16">
+            <a:extLst>
+              <a:ext uri="{FF2B5EF4-FFF2-40B4-BE49-F238E27FC236}">
+                <a16:creationId xmlns:a16="http://schemas.microsoft.com/office/drawing/2014/main" id="{2AF0C99F-FE0B-AD0E-E13B-A256126E9FCC}"/>
+              </a:ext>
+            </a:extLst>
+          </p:cNvPr>
+          <p:cNvSpPr txBox="1"/>
+          <p:nvPr/>
+        </p:nvSpPr>
+        <p:spPr>
+          <a:xfrm>
+            <a:off x="4674144" y="1093594"/>
+            <a:ext cx="3517186" cy="369332"/>
+          </a:xfrm>
+          <a:prstGeom prst="rect">
+            <a:avLst/>
+          </a:prstGeom>
+          <a:noFill/>
+        </p:spPr>
+        <p:txBody>
+          <a:bodyPr wrap="square">
+            <a:spAutoFit/>
+          </a:bodyPr>
+          <a:lstStyle/>
+          <a:p>
+            <a:pPr algn="l"/>
+            <a:r>
+              <a:rPr lang="en-US" i="0">
+                <a:solidFill>
+                  <a:srgbClr val="222222"/>
+                </a:solidFill>
+                <a:effectLst/>
+                <a:latin typeface="Harding"/>
+              </a:rPr>
+              <a:t>Laser-capture microdissection</a:t>
+            </a:r>
+            <a:endParaRPr lang="en-US" i="0" dirty="0">
+              <a:solidFill>
+                <a:srgbClr val="222222"/>
+              </a:solidFill>
+              <a:effectLst/>
+              <a:latin typeface="Harding"/>
+            </a:endParaRPr>
+          </a:p>
+        </p:txBody>
+      </p:sp>
+      <p:pic>
+        <p:nvPicPr>
+          <p:cNvPr id="1034" name="Picture 10" descr="Laser Capture Microdissection | Products | Leica Microsystems">
+            <a:extLst>
+              <a:ext uri="{FF2B5EF4-FFF2-40B4-BE49-F238E27FC236}">
+                <a16:creationId xmlns:a16="http://schemas.microsoft.com/office/drawing/2014/main" id="{39456EC9-485B-F880-F111-09F88E318887}"/>
+              </a:ext>
+            </a:extLst>
+          </p:cNvPr>
+          <p:cNvPicPr>
+            <a:picLocks noChangeAspect="1" noChangeArrowheads="1"/>
+          </p:cNvPicPr>
+          <p:nvPr/>
+        </p:nvPicPr>
+        <p:blipFill>
+          <a:blip r:embed="rId7">
+            <a:extLst>
+              <a:ext uri="{28A0092B-C50C-407E-A947-70E740481C1C}">
+                <a14:useLocalDpi xmlns:a14="http://schemas.microsoft.com/office/drawing/2010/main" val="0"/>
+              </a:ext>
+            </a:extLst>
+          </a:blip>
+          <a:srcRect/>
+          <a:stretch>
+            <a:fillRect/>
+          </a:stretch>
+        </p:blipFill>
+        <p:spPr bwMode="auto">
+          <a:xfrm>
+            <a:off x="5419380" y="1577450"/>
+            <a:ext cx="1826514" cy="1271254"/>
+          </a:xfrm>
+          <a:prstGeom prst="rect">
+            <a:avLst/>
+          </a:prstGeom>
+          <a:noFill/>
+          <a:extLst>
+            <a:ext uri="{909E8E84-426E-40DD-AFC4-6F175D3DCCD1}">
+              <a14:hiddenFill xmlns:a14="http://schemas.microsoft.com/office/drawing/2010/main">
+                <a:solidFill>
+                  <a:srgbClr val="FFFFFF"/>
+                </a:solidFill>
+              </a14:hiddenFill>
+            </a:ext>
+          </a:extLst>
+        </p:spPr>
+      </p:pic>
+      <p:sp>
+        <p:nvSpPr>
+          <p:cNvPr id="19" name="TextBox 18">
+            <a:extLst>
+              <a:ext uri="{FF2B5EF4-FFF2-40B4-BE49-F238E27FC236}">
+                <a16:creationId xmlns:a16="http://schemas.microsoft.com/office/drawing/2014/main" id="{0239F971-DC02-C800-7A0F-08D1B08B6FDE}"/>
+              </a:ext>
+            </a:extLst>
+          </p:cNvPr>
+          <p:cNvSpPr txBox="1"/>
+          <p:nvPr/>
+        </p:nvSpPr>
+        <p:spPr>
+          <a:xfrm>
+            <a:off x="4669112" y="2792049"/>
+            <a:ext cx="3245201" cy="307777"/>
+          </a:xfrm>
+          <a:prstGeom prst="rect">
+            <a:avLst/>
+          </a:prstGeom>
+          <a:noFill/>
+        </p:spPr>
+        <p:txBody>
+          <a:bodyPr wrap="square">
+            <a:spAutoFit/>
+          </a:bodyPr>
+          <a:lstStyle/>
+          <a:p>
+            <a:r>
+              <a:rPr lang="en-US" sz="700" dirty="0">
+                <a:solidFill>
+                  <a:schemeClr val="bg1">
+                    <a:lumMod val="85000"/>
+                  </a:schemeClr>
+                </a:solidFill>
+              </a:rPr>
+              <a:t>https://www.leica-microsystems.com/products/light-microscopes/laser-capture-microdissection/</a:t>
+            </a:r>
+          </a:p>
+        </p:txBody>
+      </p:sp>
+      <p:sp>
+        <p:nvSpPr>
+          <p:cNvPr id="21" name="TextBox 20">
+            <a:extLst>
+              <a:ext uri="{FF2B5EF4-FFF2-40B4-BE49-F238E27FC236}">
+                <a16:creationId xmlns:a16="http://schemas.microsoft.com/office/drawing/2014/main" id="{97127FA5-4058-A6D3-F815-3351F9830159}"/>
+              </a:ext>
+            </a:extLst>
+          </p:cNvPr>
+          <p:cNvSpPr txBox="1"/>
+          <p:nvPr/>
+        </p:nvSpPr>
+        <p:spPr>
+          <a:xfrm>
+            <a:off x="9579714" y="3610551"/>
+            <a:ext cx="2276285" cy="200055"/>
+          </a:xfrm>
+          <a:prstGeom prst="rect">
+            <a:avLst/>
+          </a:prstGeom>
+          <a:noFill/>
+        </p:spPr>
+        <p:txBody>
+          <a:bodyPr wrap="square">
+            <a:spAutoFit/>
+          </a:bodyPr>
+          <a:lstStyle/>
+          <a:p>
+            <a:r>
+              <a:rPr lang="en-US" sz="700" i="1" dirty="0">
+                <a:solidFill>
+                  <a:schemeClr val="bg1">
+                    <a:lumMod val="85000"/>
+                  </a:schemeClr>
+                </a:solidFill>
+              </a:rPr>
+              <a:t>https://www.sinobiological.com/category/fcm-facs-facs</a:t>
+            </a:r>
           </a:p>
         </p:txBody>
       </p:sp>
@@ -11562,41 +12329,6 @@
           </a:p>
         </p:txBody>
       </p:sp>
-      <p:sp>
-        <p:nvSpPr>
-          <p:cNvPr id="3" name="TextBox 2">
-            <a:extLst>
-              <a:ext uri="{FF2B5EF4-FFF2-40B4-BE49-F238E27FC236}">
-                <a16:creationId xmlns:a16="http://schemas.microsoft.com/office/drawing/2014/main" id="{F396EB75-18CA-E31A-E305-646CE0E08854}"/>
-              </a:ext>
-            </a:extLst>
-          </p:cNvPr>
-          <p:cNvSpPr txBox="1"/>
-          <p:nvPr/>
-        </p:nvSpPr>
-        <p:spPr>
-          <a:xfrm>
-            <a:off x="119743" y="844473"/>
-            <a:ext cx="4701159" cy="369332"/>
-          </a:xfrm>
-          <a:prstGeom prst="rect">
-            <a:avLst/>
-          </a:prstGeom>
-          <a:noFill/>
-        </p:spPr>
-        <p:txBody>
-          <a:bodyPr wrap="none" rtlCol="0">
-            <a:spAutoFit/>
-          </a:bodyPr>
-          <a:lstStyle/>
-          <a:p>
-            <a:r>
-              <a:rPr lang="en-US" dirty="0"/>
-              <a:t>How can inferred cell trajectories be confirmed?</a:t>
-            </a:r>
-          </a:p>
-        </p:txBody>
-      </p:sp>
       <p:pic>
         <p:nvPicPr>
           <p:cNvPr id="2052" name="Picture 4">
@@ -11697,8 +12429,8 @@
         </p:nvSpPr>
         <p:spPr>
           <a:xfrm>
-            <a:off x="119743" y="6629337"/>
-            <a:ext cx="6191250" cy="261610"/>
+            <a:off x="710293" y="6625676"/>
+            <a:ext cx="2299607" cy="246221"/>
           </a:xfrm>
           <a:prstGeom prst="rect">
             <a:avLst/>
@@ -11712,71 +12444,23 @@
           <a:lstStyle/>
           <a:p>
             <a:r>
-              <a:rPr lang="en-US" sz="1050" dirty="0"/>
-              <a:t>https://www.nature.com/articles/s41576-018-0048-4</a:t>
-            </a:r>
-          </a:p>
-        </p:txBody>
-      </p:sp>
-      <p:sp>
-        <p:nvSpPr>
-          <p:cNvPr id="12" name="TextBox 11">
-            <a:extLst>
-              <a:ext uri="{FF2B5EF4-FFF2-40B4-BE49-F238E27FC236}">
-                <a16:creationId xmlns:a16="http://schemas.microsoft.com/office/drawing/2014/main" id="{7FAE4D76-1DA1-FE62-49B9-0B7D93F64C4A}"/>
-              </a:ext>
-            </a:extLst>
-          </p:cNvPr>
-          <p:cNvSpPr txBox="1"/>
-          <p:nvPr/>
-        </p:nvSpPr>
-        <p:spPr>
-          <a:xfrm>
-            <a:off x="9674688" y="959170"/>
-            <a:ext cx="2201418" cy="369332"/>
-          </a:xfrm>
-          <a:prstGeom prst="rect">
-            <a:avLst/>
-          </a:prstGeom>
-          <a:noFill/>
-        </p:spPr>
-        <p:txBody>
-          <a:bodyPr wrap="square">
-            <a:spAutoFit/>
-          </a:bodyPr>
-          <a:lstStyle/>
-          <a:p>
-            <a:r>
-              <a:rPr lang="en-US" b="0" i="0" dirty="0">
-                <a:solidFill>
-                  <a:srgbClr val="040C28"/>
-                </a:solidFill>
+              <a:rPr lang="en-US" sz="1000" dirty="0"/>
+              <a:t>Bowling. Cell (2020) </a:t>
+            </a:r>
+            <a:r>
+              <a:rPr lang="en-US" sz="1000" b="0" i="0" dirty="0">
                 <a:effectLst/>
-                <a:latin typeface="Google Sans"/>
+                <a:latin typeface="BlinkMacSystemFont"/>
               </a:rPr>
-              <a:t>Cre-</a:t>
-            </a:r>
-            <a:r>
-              <a:rPr lang="en-US" b="0" i="0" dirty="0" err="1">
-                <a:solidFill>
-                  <a:srgbClr val="040C28"/>
-                </a:solidFill>
-                <a:effectLst/>
-                <a:latin typeface="Google Sans"/>
+              <a:t>181(6)</a:t>
+            </a:r>
+            <a:r>
+              <a:rPr lang="en-US" sz="1000" dirty="0">
+                <a:latin typeface="BlinkMacSystemFont"/>
               </a:rPr>
-              <a:t>loxP</a:t>
-            </a:r>
-            <a:r>
-              <a:rPr lang="en-US" b="0" i="0" dirty="0">
-                <a:solidFill>
-                  <a:srgbClr val="040C28"/>
-                </a:solidFill>
-                <a:effectLst/>
-                <a:latin typeface="Google Sans"/>
-              </a:rPr>
-              <a:t> system</a:t>
-            </a:r>
-            <a:endParaRPr lang="en-US" dirty="0"/>
+              <a:t>.</a:t>
+            </a:r>
+            <a:endParaRPr lang="en-US" sz="1000" dirty="0"/>
           </a:p>
         </p:txBody>
       </p:sp>
@@ -11817,8 +12501,8 @@
         </p:blipFill>
         <p:spPr bwMode="auto">
           <a:xfrm>
-            <a:off x="3869035" y="746809"/>
-            <a:ext cx="5339309" cy="4509550"/>
+            <a:off x="611995" y="748165"/>
+            <a:ext cx="3174110" cy="2680835"/>
           </a:xfrm>
           <a:prstGeom prst="rect">
             <a:avLst/>
@@ -11849,7 +12533,7 @@
         </p:nvSpPr>
         <p:spPr>
           <a:xfrm>
-            <a:off x="4889754" y="6629337"/>
+            <a:off x="5908929" y="6527044"/>
             <a:ext cx="2493645" cy="261610"/>
           </a:xfrm>
           <a:prstGeom prst="rect">
@@ -11918,10 +12602,10 @@
       </p:sp>
       <p:pic>
         <p:nvPicPr>
-          <p:cNvPr id="2056" name="Picture 8">
+          <p:cNvPr id="3074" name="Picture 2">
             <a:extLst>
               <a:ext uri="{FF2B5EF4-FFF2-40B4-BE49-F238E27FC236}">
-                <a16:creationId xmlns:a16="http://schemas.microsoft.com/office/drawing/2014/main" id="{9F8E964D-D5E6-C4DD-2165-38252B27C37A}"/>
+                <a16:creationId xmlns:a16="http://schemas.microsoft.com/office/drawing/2014/main" id="{2B000C2D-6090-0CFF-C7CE-BAF990ECF30B}"/>
               </a:ext>
             </a:extLst>
           </p:cNvPr>
@@ -11930,7 +12614,7 @@
           </p:cNvPicPr>
           <p:nvPr/>
         </p:nvPicPr>
-        <p:blipFill rotWithShape="1">
+        <p:blipFill>
           <a:blip r:embed="rId4">
             <a:extLst>
               <a:ext uri="{28A0092B-C50C-407E-A947-70E740481C1C}">
@@ -11938,13 +12622,15 @@
               </a:ext>
             </a:extLst>
           </a:blip>
-          <a:srcRect b="60203"/>
-          <a:stretch/>
+          <a:srcRect/>
+          <a:stretch>
+            <a:fillRect/>
+          </a:stretch>
         </p:blipFill>
         <p:spPr bwMode="auto">
           <a:xfrm>
-            <a:off x="9290640" y="1328502"/>
-            <a:ext cx="2450256" cy="1216020"/>
+            <a:off x="4458192" y="1163658"/>
+            <a:ext cx="7048992" cy="4675167"/>
           </a:xfrm>
           <a:prstGeom prst="rect">
             <a:avLst/>
@@ -11961,41 +12647,6 @@
           </a:extLst>
         </p:spPr>
       </p:pic>
-      <p:sp>
-        <p:nvSpPr>
-          <p:cNvPr id="16" name="TextBox 15">
-            <a:extLst>
-              <a:ext uri="{FF2B5EF4-FFF2-40B4-BE49-F238E27FC236}">
-                <a16:creationId xmlns:a16="http://schemas.microsoft.com/office/drawing/2014/main" id="{ADF89AA4-AB13-88E4-7B9C-DEC60AD144BA}"/>
-              </a:ext>
-            </a:extLst>
-          </p:cNvPr>
-          <p:cNvSpPr txBox="1"/>
-          <p:nvPr/>
-        </p:nvSpPr>
-        <p:spPr>
-          <a:xfrm>
-            <a:off x="10318895" y="6045223"/>
-            <a:ext cx="1753362" cy="261610"/>
-          </a:xfrm>
-          <a:prstGeom prst="rect">
-            <a:avLst/>
-          </a:prstGeom>
-          <a:noFill/>
-        </p:spPr>
-        <p:txBody>
-          <a:bodyPr wrap="square">
-            <a:spAutoFit/>
-          </a:bodyPr>
-          <a:lstStyle/>
-          <a:p>
-            <a:r>
-              <a:rPr lang="en-US" sz="1050" dirty="0"/>
-              <a:t>Kretzschmar, K. Cell (2012)</a:t>
-            </a:r>
-          </a:p>
-        </p:txBody>
-      </p:sp>
     </p:spTree>
     <p:extLst>
       <p:ext uri="{BB962C8B-B14F-4D97-AF65-F5344CB8AC3E}">
@@ -12031,6 +12682,235 @@
           <p:cNvPr id="2" name="Title 1">
             <a:extLst>
               <a:ext uri="{FF2B5EF4-FFF2-40B4-BE49-F238E27FC236}">
+                <a16:creationId xmlns:a16="http://schemas.microsoft.com/office/drawing/2014/main" id="{5456C80A-D5D0-FF23-5FC7-F6CEA090D64F}"/>
+              </a:ext>
+            </a:extLst>
+          </p:cNvPr>
+          <p:cNvSpPr>
+            <a:spLocks noGrp="1"/>
+          </p:cNvSpPr>
+          <p:nvPr>
+            <p:ph type="title"/>
+          </p:nvPr>
+        </p:nvSpPr>
+        <p:spPr/>
+        <p:txBody>
+          <a:bodyPr/>
+          <a:lstStyle/>
+          <a:p>
+            <a:r>
+              <a:rPr lang="en-US" dirty="0"/>
+              <a:t>Advantages and Disadvantages</a:t>
+            </a:r>
+          </a:p>
+        </p:txBody>
+      </p:sp>
+      <p:pic>
+        <p:nvPicPr>
+          <p:cNvPr id="2050" name="Picture 2">
+            <a:extLst>
+              <a:ext uri="{FF2B5EF4-FFF2-40B4-BE49-F238E27FC236}">
+                <a16:creationId xmlns:a16="http://schemas.microsoft.com/office/drawing/2014/main" id="{266E8765-66AD-B25C-4833-326A54E44A8F}"/>
+              </a:ext>
+            </a:extLst>
+          </p:cNvPr>
+          <p:cNvPicPr>
+            <a:picLocks noChangeAspect="1" noChangeArrowheads="1"/>
+          </p:cNvPicPr>
+          <p:nvPr/>
+        </p:nvPicPr>
+        <p:blipFill rotWithShape="1">
+          <a:blip r:embed="rId2">
+            <a:extLst>
+              <a:ext uri="{28A0092B-C50C-407E-A947-70E740481C1C}">
+                <a14:useLocalDpi xmlns:a14="http://schemas.microsoft.com/office/drawing/2010/main" val="0"/>
+              </a:ext>
+            </a:extLst>
+          </a:blip>
+          <a:srcRect l="5188" b="53889"/>
+          <a:stretch/>
+        </p:blipFill>
+        <p:spPr bwMode="auto">
+          <a:xfrm>
+            <a:off x="352425" y="1352550"/>
+            <a:ext cx="5049774" cy="3162300"/>
+          </a:xfrm>
+          <a:prstGeom prst="rect">
+            <a:avLst/>
+          </a:prstGeom>
+          <a:noFill/>
+          <a:extLst>
+            <a:ext uri="{909E8E84-426E-40DD-AFC4-6F175D3DCCD1}">
+              <a14:hiddenFill xmlns:a14="http://schemas.microsoft.com/office/drawing/2010/main">
+                <a:solidFill>
+                  <a:srgbClr val="FFFFFF"/>
+                </a:solidFill>
+              </a14:hiddenFill>
+            </a:ext>
+          </a:extLst>
+        </p:spPr>
+      </p:pic>
+      <p:pic>
+        <p:nvPicPr>
+          <p:cNvPr id="3" name="Picture 2">
+            <a:extLst>
+              <a:ext uri="{FF2B5EF4-FFF2-40B4-BE49-F238E27FC236}">
+                <a16:creationId xmlns:a16="http://schemas.microsoft.com/office/drawing/2014/main" id="{F59D733A-97FA-84CF-49E8-05E4A5B0A37A}"/>
+              </a:ext>
+            </a:extLst>
+          </p:cNvPr>
+          <p:cNvPicPr>
+            <a:picLocks noChangeAspect="1" noChangeArrowheads="1"/>
+          </p:cNvPicPr>
+          <p:nvPr/>
+        </p:nvPicPr>
+        <p:blipFill rotWithShape="1">
+          <a:blip r:embed="rId2">
+            <a:extLst>
+              <a:ext uri="{28A0092B-C50C-407E-A947-70E740481C1C}">
+                <a14:useLocalDpi xmlns:a14="http://schemas.microsoft.com/office/drawing/2010/main" val="0"/>
+              </a:ext>
+            </a:extLst>
+          </a:blip>
+          <a:srcRect t="45972"/>
+          <a:stretch/>
+        </p:blipFill>
+        <p:spPr bwMode="auto">
+          <a:xfrm>
+            <a:off x="5189537" y="1000126"/>
+            <a:ext cx="6228962" cy="4333352"/>
+          </a:xfrm>
+          <a:prstGeom prst="rect">
+            <a:avLst/>
+          </a:prstGeom>
+          <a:noFill/>
+          <a:extLst>
+            <a:ext uri="{909E8E84-426E-40DD-AFC4-6F175D3DCCD1}">
+              <a14:hiddenFill xmlns:a14="http://schemas.microsoft.com/office/drawing/2010/main">
+                <a:solidFill>
+                  <a:srgbClr val="FFFFFF"/>
+                </a:solidFill>
+              </a14:hiddenFill>
+            </a:ext>
+          </a:extLst>
+        </p:spPr>
+      </p:pic>
+      <p:sp>
+        <p:nvSpPr>
+          <p:cNvPr id="4" name="TextBox 3">
+            <a:extLst>
+              <a:ext uri="{FF2B5EF4-FFF2-40B4-BE49-F238E27FC236}">
+                <a16:creationId xmlns:a16="http://schemas.microsoft.com/office/drawing/2014/main" id="{A0C7D57D-EB25-0273-E7AD-C43A343CF085}"/>
+              </a:ext>
+            </a:extLst>
+          </p:cNvPr>
+          <p:cNvSpPr txBox="1"/>
+          <p:nvPr/>
+        </p:nvSpPr>
+        <p:spPr>
+          <a:xfrm>
+            <a:off x="3251454" y="6305487"/>
+            <a:ext cx="2493645" cy="261610"/>
+          </a:xfrm>
+          <a:prstGeom prst="rect">
+            <a:avLst/>
+          </a:prstGeom>
+          <a:noFill/>
+        </p:spPr>
+        <p:txBody>
+          <a:bodyPr wrap="square">
+            <a:spAutoFit/>
+          </a:bodyPr>
+          <a:lstStyle/>
+          <a:p>
+            <a:r>
+              <a:rPr lang="en-US" sz="1050" b="0" i="0" dirty="0">
+                <a:solidFill>
+                  <a:srgbClr val="333333"/>
+                </a:solidFill>
+                <a:effectLst/>
+                <a:latin typeface="-apple-system"/>
+              </a:rPr>
+              <a:t>Zhang, Y et al. </a:t>
+            </a:r>
+            <a:r>
+              <a:rPr lang="en-US" sz="1050" b="0" i="1" dirty="0">
+                <a:solidFill>
+                  <a:srgbClr val="333333"/>
+                </a:solidFill>
+                <a:effectLst/>
+                <a:latin typeface="-apple-system"/>
+              </a:rPr>
+              <a:t>Stem Cell Res </a:t>
+            </a:r>
+            <a:r>
+              <a:rPr lang="en-US" sz="1050" b="0" i="1" dirty="0" err="1">
+                <a:solidFill>
+                  <a:srgbClr val="333333"/>
+                </a:solidFill>
+                <a:effectLst/>
+                <a:latin typeface="-apple-system"/>
+              </a:rPr>
+              <a:t>Ther</a:t>
+            </a:r>
+            <a:r>
+              <a:rPr lang="en-US" sz="1050" dirty="0">
+                <a:solidFill>
+                  <a:srgbClr val="333333"/>
+                </a:solidFill>
+                <a:latin typeface="-apple-system"/>
+              </a:rPr>
+              <a:t>. </a:t>
+            </a:r>
+            <a:r>
+              <a:rPr lang="en-US" sz="1050" b="0" i="0" dirty="0">
+                <a:solidFill>
+                  <a:srgbClr val="333333"/>
+                </a:solidFill>
+                <a:effectLst/>
+                <a:latin typeface="-apple-system"/>
+              </a:rPr>
+              <a:t>(2020)</a:t>
+            </a:r>
+            <a:endParaRPr lang="en-US" sz="1050" dirty="0"/>
+          </a:p>
+        </p:txBody>
+      </p:sp>
+    </p:spTree>
+    <p:extLst>
+      <p:ext uri="{BB962C8B-B14F-4D97-AF65-F5344CB8AC3E}">
+        <p14:creationId xmlns:p14="http://schemas.microsoft.com/office/powerpoint/2010/main" val="1142456642"/>
+      </p:ext>
+    </p:extLst>
+  </p:cSld>
+  <p:clrMapOvr>
+    <a:masterClrMapping/>
+  </p:clrMapOvr>
+</p:sld>
+</file>
+
+<file path=ppt/slides/slide9.xml><?xml version="1.0" encoding="utf-8"?>
+<p:sld xmlns:a="http://schemas.openxmlformats.org/drawingml/2006/main" xmlns:r="http://schemas.openxmlformats.org/officeDocument/2006/relationships" xmlns:p="http://schemas.openxmlformats.org/presentationml/2006/main">
+  <p:cSld>
+    <p:spTree>
+      <p:nvGrpSpPr>
+        <p:cNvPr id="1" name=""/>
+        <p:cNvGrpSpPr/>
+        <p:nvPr/>
+      </p:nvGrpSpPr>
+      <p:grpSpPr>
+        <a:xfrm>
+          <a:off x="0" y="0"/>
+          <a:ext cx="0" cy="0"/>
+          <a:chOff x="0" y="0"/>
+          <a:chExt cx="0" cy="0"/>
+        </a:xfrm>
+      </p:grpSpPr>
+      <p:sp>
+        <p:nvSpPr>
+          <p:cNvPr id="2" name="Title 1">
+            <a:extLst>
+              <a:ext uri="{FF2B5EF4-FFF2-40B4-BE49-F238E27FC236}">
                 <a16:creationId xmlns:a16="http://schemas.microsoft.com/office/drawing/2014/main" id="{61FCFAEE-71FB-72EA-197E-04A959CC83EF}"/>
               </a:ext>
             </a:extLst>
@@ -12391,99 +13271,6 @@
     <p:extLst>
       <p:ext uri="{BB962C8B-B14F-4D97-AF65-F5344CB8AC3E}">
         <p14:creationId xmlns:p14="http://schemas.microsoft.com/office/powerpoint/2010/main" val="2249498869"/>
-      </p:ext>
-    </p:extLst>
-  </p:cSld>
-  <p:clrMapOvr>
-    <a:masterClrMapping/>
-  </p:clrMapOvr>
-</p:sld>
-</file>
-
-<file path=ppt/slides/slide9.xml><?xml version="1.0" encoding="utf-8"?>
-<p:sld xmlns:a="http://schemas.openxmlformats.org/drawingml/2006/main" xmlns:r="http://schemas.openxmlformats.org/officeDocument/2006/relationships" xmlns:p="http://schemas.openxmlformats.org/presentationml/2006/main">
-  <p:cSld>
-    <p:spTree>
-      <p:nvGrpSpPr>
-        <p:cNvPr id="1" name=""/>
-        <p:cNvGrpSpPr/>
-        <p:nvPr/>
-      </p:nvGrpSpPr>
-      <p:grpSpPr>
-        <a:xfrm>
-          <a:off x="0" y="0"/>
-          <a:ext cx="0" cy="0"/>
-          <a:chOff x="0" y="0"/>
-          <a:chExt cx="0" cy="0"/>
-        </a:xfrm>
-      </p:grpSpPr>
-      <p:sp>
-        <p:nvSpPr>
-          <p:cNvPr id="2" name="Title 1">
-            <a:extLst>
-              <a:ext uri="{FF2B5EF4-FFF2-40B4-BE49-F238E27FC236}">
-                <a16:creationId xmlns:a16="http://schemas.microsoft.com/office/drawing/2014/main" id="{CD43B99E-6447-04B6-9A03-5D54778593DD}"/>
-              </a:ext>
-            </a:extLst>
-          </p:cNvPr>
-          <p:cNvSpPr>
-            <a:spLocks noGrp="1"/>
-          </p:cNvSpPr>
-          <p:nvPr>
-            <p:ph type="title"/>
-          </p:nvPr>
-        </p:nvSpPr>
-        <p:spPr/>
-        <p:txBody>
-          <a:bodyPr/>
-          <a:lstStyle/>
-          <a:p>
-            <a:r>
-              <a:rPr lang="en-US" dirty="0"/>
-              <a:t>The Challenge of Reproducibility</a:t>
-            </a:r>
-          </a:p>
-        </p:txBody>
-      </p:sp>
-      <p:sp>
-        <p:nvSpPr>
-          <p:cNvPr id="4" name="TextBox 3">
-            <a:extLst>
-              <a:ext uri="{FF2B5EF4-FFF2-40B4-BE49-F238E27FC236}">
-                <a16:creationId xmlns:a16="http://schemas.microsoft.com/office/drawing/2014/main" id="{FBB465FF-77F1-494A-1CC8-270A63C3DA00}"/>
-              </a:ext>
-            </a:extLst>
-          </p:cNvPr>
-          <p:cNvSpPr txBox="1"/>
-          <p:nvPr/>
-        </p:nvSpPr>
-        <p:spPr>
-          <a:xfrm>
-            <a:off x="585216" y="1280160"/>
-            <a:ext cx="3213893" cy="369332"/>
-          </a:xfrm>
-          <a:prstGeom prst="rect">
-            <a:avLst/>
-          </a:prstGeom>
-          <a:noFill/>
-        </p:spPr>
-        <p:txBody>
-          <a:bodyPr wrap="none" rtlCol="0">
-            <a:spAutoFit/>
-          </a:bodyPr>
-          <a:lstStyle/>
-          <a:p>
-            <a:r>
-              <a:rPr lang="en-US" dirty="0"/>
-              <a:t>Part of the challenge of making  </a:t>
-            </a:r>
-          </a:p>
-        </p:txBody>
-      </p:sp>
-    </p:spTree>
-    <p:extLst>
-      <p:ext uri="{BB962C8B-B14F-4D97-AF65-F5344CB8AC3E}">
-        <p14:creationId xmlns:p14="http://schemas.microsoft.com/office/powerpoint/2010/main" val="1583192240"/>
       </p:ext>
     </p:extLst>
   </p:cSld>

</xml_diff>

<commit_message>
Updates to monocle code, M6, M7.
</commit_message>
<xml_diff>
--- a/M7_Summary/M7_Best_Practices.pptx
+++ b/M7_Summary/M7_Best_Practices.pptx
@@ -208,7 +208,7 @@
           <a:p>
             <a:fld id="{FF40CFF0-3E11-4AF6-9747-7919C58FBC48}" type="datetimeFigureOut">
               <a:rPr lang="en-US" smtClean="0"/>
-              <a:t>4/1/2024</a:t>
+              <a:t>4/2/2024</a:t>
             </a:fld>
             <a:endParaRPr lang="en-US"/>
           </a:p>
@@ -632,7 +632,7 @@
           <a:p>
             <a:fld id="{9F69634C-F75C-45F7-A87A-C5E2AF3ECA41}" type="datetimeFigureOut">
               <a:rPr lang="en-US" smtClean="0"/>
-              <a:t>4/1/2024</a:t>
+              <a:t>4/2/2024</a:t>
             </a:fld>
             <a:endParaRPr lang="en-US"/>
           </a:p>
@@ -797,7 +797,7 @@
           <a:p>
             <a:fld id="{9F69634C-F75C-45F7-A87A-C5E2AF3ECA41}" type="datetimeFigureOut">
               <a:rPr lang="en-US" smtClean="0"/>
-              <a:t>4/1/2024</a:t>
+              <a:t>4/2/2024</a:t>
             </a:fld>
             <a:endParaRPr lang="en-US"/>
           </a:p>
@@ -1000,7 +1000,7 @@
           <a:p>
             <a:fld id="{9F69634C-F75C-45F7-A87A-C5E2AF3ECA41}" type="datetimeFigureOut">
               <a:rPr lang="en-US" smtClean="0"/>
-              <a:t>4/1/2024</a:t>
+              <a:t>4/2/2024</a:t>
             </a:fld>
             <a:endParaRPr lang="en-US"/>
           </a:p>
@@ -1265,7 +1265,7 @@
           <a:p>
             <a:fld id="{9F69634C-F75C-45F7-A87A-C5E2AF3ECA41}" type="datetimeFigureOut">
               <a:rPr lang="en-US" smtClean="0"/>
-              <a:t>4/1/2024</a:t>
+              <a:t>4/2/2024</a:t>
             </a:fld>
             <a:endParaRPr lang="en-US"/>
           </a:p>
@@ -1378,7 +1378,7 @@
           <a:p>
             <a:fld id="{9F69634C-F75C-45F7-A87A-C5E2AF3ECA41}" type="datetimeFigureOut">
               <a:rPr lang="en-US" smtClean="0"/>
-              <a:t>4/1/2024</a:t>
+              <a:t>4/2/2024</a:t>
             </a:fld>
             <a:endParaRPr lang="en-US"/>
           </a:p>
@@ -1620,7 +1620,7 @@
           <a:p>
             <a:fld id="{9F69634C-F75C-45F7-A87A-C5E2AF3ECA41}" type="datetimeFigureOut">
               <a:rPr lang="en-US" smtClean="0"/>
-              <a:t>4/1/2024</a:t>
+              <a:t>4/2/2024</a:t>
             </a:fld>
             <a:endParaRPr lang="en-US"/>
           </a:p>
@@ -2560,7 +2560,7 @@
         </p:nvSpPr>
         <p:spPr>
           <a:xfrm>
-            <a:off x="566166" y="1146810"/>
+            <a:off x="246126" y="890778"/>
             <a:ext cx="3213893" cy="369332"/>
           </a:xfrm>
           <a:prstGeom prst="rect">
@@ -11034,7 +11034,7 @@
         </p:nvSpPr>
         <p:spPr>
           <a:xfrm>
-            <a:off x="169291" y="6336778"/>
+            <a:off x="327406" y="6327634"/>
             <a:ext cx="6191250" cy="400110"/>
           </a:xfrm>
           <a:prstGeom prst="rect">
@@ -12533,7 +12533,7 @@
         </p:nvSpPr>
         <p:spPr>
           <a:xfrm>
-            <a:off x="5908929" y="6527044"/>
+            <a:off x="6192393" y="6042412"/>
             <a:ext cx="2493645" cy="261610"/>
           </a:xfrm>
           <a:prstGeom prst="rect">
@@ -12809,7 +12809,7 @@
         </p:nvSpPr>
         <p:spPr>
           <a:xfrm>
-            <a:off x="3251454" y="6305487"/>
+            <a:off x="3864102" y="6524943"/>
             <a:ext cx="2493645" cy="261610"/>
           </a:xfrm>
           <a:prstGeom prst="rect">

</xml_diff>